<commit_message>
Updated files with corrections
</commit_message>
<xml_diff>
--- a/slides/klasse11.pptx
+++ b/slides/klasse11.pptx
@@ -112,6 +112,11 @@
       </a:defRPr>
     </a:lvl9pPr>
   </p:defaultTextStyle>
+  <p:extLst>
+    <p:ext uri="{EFAFB233-063F-42B5-8137-9DF3F51BA10A}">
+      <p15:sldGuideLst xmlns:p15="http://schemas.microsoft.com/office/powerpoint/2012/main"/>
+    </p:ext>
+  </p:extLst>
 </p:presentation>
 </file>
 
@@ -306,7 +311,7 @@
           <a:p>
             <a:fld id="{2CFBA415-8B7A-FA46-891B-C39ECC946916}" type="datetimeFigureOut">
               <a:rPr lang="en-US" smtClean="0"/>
-              <a:t>6/7/16</a:t>
+              <a:t>6/15/16</a:t>
             </a:fld>
             <a:endParaRPr lang="en-US"/>
           </a:p>
@@ -742,7 +747,7 @@
           <a:p>
             <a:fld id="{2CFBA415-8B7A-FA46-891B-C39ECC946916}" type="datetimeFigureOut">
               <a:rPr lang="en-US" smtClean="0"/>
-              <a:t>6/7/16</a:t>
+              <a:t>6/15/16</a:t>
             </a:fld>
             <a:endParaRPr lang="en-US"/>
           </a:p>
@@ -992,7 +997,7 @@
           <a:p>
             <a:fld id="{2CFBA415-8B7A-FA46-891B-C39ECC946916}" type="datetimeFigureOut">
               <a:rPr lang="en-US" smtClean="0"/>
-              <a:t>6/7/16</a:t>
+              <a:t>6/15/16</a:t>
             </a:fld>
             <a:endParaRPr lang="en-US"/>
           </a:p>
@@ -1300,7 +1305,7 @@
           <a:p>
             <a:fld id="{2CFBA415-8B7A-FA46-891B-C39ECC946916}" type="datetimeFigureOut">
               <a:rPr lang="en-US" smtClean="0"/>
-              <a:t>6/7/16</a:t>
+              <a:t>6/15/16</a:t>
             </a:fld>
             <a:endParaRPr lang="en-US"/>
           </a:p>
@@ -1618,7 +1623,7 @@
           <a:p>
             <a:fld id="{2CFBA415-8B7A-FA46-891B-C39ECC946916}" type="datetimeFigureOut">
               <a:rPr lang="en-US" smtClean="0"/>
-              <a:t>6/7/16</a:t>
+              <a:t>6/15/16</a:t>
             </a:fld>
             <a:endParaRPr lang="en-US"/>
           </a:p>
@@ -1920,7 +1925,7 @@
           <a:p>
             <a:fld id="{2CFBA415-8B7A-FA46-891B-C39ECC946916}" type="datetimeFigureOut">
               <a:rPr lang="en-US" smtClean="0"/>
-              <a:t>6/7/16</a:t>
+              <a:t>6/15/16</a:t>
             </a:fld>
             <a:endParaRPr lang="en-US"/>
           </a:p>
@@ -2287,7 +2292,7 @@
           <a:p>
             <a:fld id="{2CFBA415-8B7A-FA46-891B-C39ECC946916}" type="datetimeFigureOut">
               <a:rPr lang="en-US" smtClean="0"/>
-              <a:t>6/7/16</a:t>
+              <a:t>6/15/16</a:t>
             </a:fld>
             <a:endParaRPr lang="en-US"/>
           </a:p>
@@ -2461,7 +2466,7 @@
           <a:p>
             <a:fld id="{2CFBA415-8B7A-FA46-891B-C39ECC946916}" type="datetimeFigureOut">
               <a:rPr lang="en-US" smtClean="0"/>
-              <a:t>6/7/16</a:t>
+              <a:t>6/15/16</a:t>
             </a:fld>
             <a:endParaRPr lang="en-US"/>
           </a:p>
@@ -2641,7 +2646,7 @@
           <a:p>
             <a:fld id="{2CFBA415-8B7A-FA46-891B-C39ECC946916}" type="datetimeFigureOut">
               <a:rPr lang="en-US" smtClean="0"/>
-              <a:t>6/7/16</a:t>
+              <a:t>6/15/16</a:t>
             </a:fld>
             <a:endParaRPr lang="en-US"/>
           </a:p>
@@ -2811,7 +2816,7 @@
           <a:p>
             <a:fld id="{2CFBA415-8B7A-FA46-891B-C39ECC946916}" type="datetimeFigureOut">
               <a:rPr lang="en-US" smtClean="0"/>
-              <a:t>6/7/16</a:t>
+              <a:t>6/15/16</a:t>
             </a:fld>
             <a:endParaRPr lang="en-US"/>
           </a:p>
@@ -3061,7 +3066,7 @@
           <a:p>
             <a:fld id="{2CFBA415-8B7A-FA46-891B-C39ECC946916}" type="datetimeFigureOut">
               <a:rPr lang="en-US" smtClean="0"/>
-              <a:t>6/7/16</a:t>
+              <a:t>6/15/16</a:t>
             </a:fld>
             <a:endParaRPr lang="en-US"/>
           </a:p>
@@ -3297,7 +3302,7 @@
           <a:p>
             <a:fld id="{2CFBA415-8B7A-FA46-891B-C39ECC946916}" type="datetimeFigureOut">
               <a:rPr lang="en-US" smtClean="0"/>
-              <a:t>6/7/16</a:t>
+              <a:t>6/15/16</a:t>
             </a:fld>
             <a:endParaRPr lang="en-US"/>
           </a:p>
@@ -3679,7 +3684,7 @@
           <a:p>
             <a:fld id="{2CFBA415-8B7A-FA46-891B-C39ECC946916}" type="datetimeFigureOut">
               <a:rPr lang="en-US" smtClean="0"/>
-              <a:t>6/7/16</a:t>
+              <a:t>6/15/16</a:t>
             </a:fld>
             <a:endParaRPr lang="en-US"/>
           </a:p>
@@ -3797,7 +3802,7 @@
           <a:p>
             <a:fld id="{2CFBA415-8B7A-FA46-891B-C39ECC946916}" type="datetimeFigureOut">
               <a:rPr lang="en-US" smtClean="0"/>
-              <a:t>6/7/16</a:t>
+              <a:t>6/15/16</a:t>
             </a:fld>
             <a:endParaRPr lang="en-US"/>
           </a:p>
@@ -3892,7 +3897,7 @@
           <a:p>
             <a:fld id="{2CFBA415-8B7A-FA46-891B-C39ECC946916}" type="datetimeFigureOut">
               <a:rPr lang="en-US" smtClean="0"/>
-              <a:t>6/7/16</a:t>
+              <a:t>6/15/16</a:t>
             </a:fld>
             <a:endParaRPr lang="en-US"/>
           </a:p>
@@ -4147,7 +4152,7 @@
           <a:p>
             <a:fld id="{2CFBA415-8B7A-FA46-891B-C39ECC946916}" type="datetimeFigureOut">
               <a:rPr lang="en-US" smtClean="0"/>
-              <a:t>6/7/16</a:t>
+              <a:t>6/15/16</a:t>
             </a:fld>
             <a:endParaRPr lang="en-US"/>
           </a:p>
@@ -4430,7 +4435,7 @@
           <a:p>
             <a:fld id="{2CFBA415-8B7A-FA46-891B-C39ECC946916}" type="datetimeFigureOut">
               <a:rPr lang="en-US" smtClean="0"/>
-              <a:t>6/7/16</a:t>
+              <a:t>6/15/16</a:t>
             </a:fld>
             <a:endParaRPr lang="en-US"/>
           </a:p>
@@ -4836,7 +4841,7 @@
           <a:p>
             <a:fld id="{2CFBA415-8B7A-FA46-891B-C39ECC946916}" type="datetimeFigureOut">
               <a:rPr lang="en-US" smtClean="0"/>
-              <a:t>6/7/16</a:t>
+              <a:t>6/15/16</a:t>
             </a:fld>
             <a:endParaRPr lang="en-US"/>
           </a:p>
@@ -5433,6 +5438,13 @@
   <p:clrMapOvr>
     <a:masterClrMapping/>
   </p:clrMapOvr>
+  <p:timing>
+    <p:tnLst>
+      <p:par>
+        <p:cTn id="1" dur="indefinite" restart="never" nodeType="tmRoot"/>
+      </p:par>
+    </p:tnLst>
+  </p:timing>
 </p:sld>
 </file>
 
@@ -5515,6 +5527,13 @@
   <p:clrMapOvr>
     <a:masterClrMapping/>
   </p:clrMapOvr>
+  <p:timing>
+    <p:tnLst>
+      <p:par>
+        <p:cTn id="1" dur="indefinite" restart="never" nodeType="tmRoot"/>
+      </p:par>
+    </p:tnLst>
+  </p:timing>
 </p:sld>
 </file>
 
@@ -7955,20 +7974,12 @@
               <a:t>Author: </a:t>
             </a:r>
             <a:r>
-              <a:rPr lang="en-US" i="1" dirty="0" err="1" smtClean="0"/>
-              <a:t>Grabriel</a:t>
-            </a:r>
-            <a:r>
               <a:rPr lang="en-US" i="1" dirty="0" smtClean="0"/>
-              <a:t> </a:t>
-            </a:r>
-            <a:r>
-              <a:rPr lang="en-US" i="1" dirty="0" err="1" smtClean="0"/>
-              <a:t>Garcuia</a:t>
+              <a:t>Gabriel Garcia </a:t>
             </a:r>
             <a:r>
               <a:rPr lang="en-US" i="1" dirty="0" smtClean="0"/>
-              <a:t> Marquez</a:t>
+              <a:t>Marquez</a:t>
             </a:r>
             <a:br>
               <a:rPr lang="en-US" i="1" dirty="0" smtClean="0"/>
@@ -8068,19 +8079,7 @@
             </a:r>
             <a:r>
               <a:rPr lang="en-US" sz="1400" dirty="0"/>
-              <a:t> = </a:t>
-            </a:r>
-            <a:r>
-              <a:rPr lang="en-US" sz="1400" dirty="0"/>
-              <a:t>open</a:t>
-            </a:r>
-            <a:r>
-              <a:rPr lang="en-US" sz="1400" dirty="0"/>
-              <a:t>(</a:t>
-            </a:r>
-            <a:r>
-              <a:rPr lang="en-US" sz="1400" dirty="0"/>
-              <a:t>"../data/</a:t>
+              <a:t> = open("../data/</a:t>
             </a:r>
             <a:r>
               <a:rPr lang="en-US" sz="1400" dirty="0" err="1"/>
@@ -8088,11 +8087,7 @@
             </a:r>
             <a:r>
               <a:rPr lang="en-US" sz="1400" dirty="0"/>
-              <a:t>"</a:t>
-            </a:r>
-            <a:r>
-              <a:rPr lang="en-US" sz="1400" dirty="0"/>
-              <a:t>)</a:t>
+              <a:t>")</a:t>
             </a:r>
             <a:br>
               <a:rPr lang="en-US" sz="1400" dirty="0"/>
@@ -8156,15 +8151,7 @@
             </a:r>
             <a:r>
               <a:rPr lang="en-US" sz="1400" dirty="0"/>
-              <a:t>(</a:t>
-            </a:r>
-            <a:r>
-              <a:rPr lang="en-US" sz="1400" dirty="0"/>
-              <a:t>"book"</a:t>
-            </a:r>
-            <a:r>
-              <a:rPr lang="en-US" sz="1400" dirty="0"/>
-              <a:t>)</a:t>
+              <a:t>("book")</a:t>
             </a:r>
             <a:br>
               <a:rPr lang="en-US" sz="1400" dirty="0"/>
@@ -8182,11 +8169,7 @@
             </a:r>
             <a:r>
               <a:rPr lang="en-US" sz="1400" dirty="0"/>
-              <a:t>"Title : %s" </a:t>
-            </a:r>
-            <a:r>
-              <a:rPr lang="en-US" sz="1400" dirty="0"/>
-              <a:t>% </a:t>
+              <a:t>"Title : %s" % </a:t>
             </a:r>
             <a:r>
               <a:rPr lang="en-US" sz="1400" dirty="0" err="1"/>
@@ -8194,15 +8177,7 @@
             </a:r>
             <a:r>
               <a:rPr lang="en-US" sz="1400" dirty="0"/>
-              <a:t>(</a:t>
-            </a:r>
-            <a:r>
-              <a:rPr lang="en-US" sz="1400" dirty="0"/>
-              <a:t>"title"</a:t>
-            </a:r>
-            <a:r>
-              <a:rPr lang="en-US" sz="1400" dirty="0"/>
-              <a:t>).text</a:t>
+              <a:t>("title").text</a:t>
             </a:r>
             <a:br>
               <a:rPr lang="en-US" sz="1400" dirty="0"/>
@@ -8213,11 +8188,7 @@
             </a:r>
             <a:r>
               <a:rPr lang="en-US" sz="1400" dirty="0"/>
-              <a:t>"Author: %s" </a:t>
-            </a:r>
-            <a:r>
-              <a:rPr lang="en-US" sz="1400" dirty="0"/>
-              <a:t>% </a:t>
+              <a:t>"Author: %s" % </a:t>
             </a:r>
             <a:r>
               <a:rPr lang="en-US" sz="1400" dirty="0" err="1"/>
@@ -8225,15 +8196,7 @@
             </a:r>
             <a:r>
               <a:rPr lang="en-US" sz="1400" dirty="0"/>
-              <a:t>(</a:t>
-            </a:r>
-            <a:r>
-              <a:rPr lang="en-US" sz="1400" dirty="0"/>
-              <a:t>"author"</a:t>
-            </a:r>
-            <a:r>
-              <a:rPr lang="en-US" sz="1400" dirty="0"/>
-              <a:t>).text</a:t>
+              <a:t>("author").text</a:t>
             </a:r>
             <a:br>
               <a:rPr lang="en-US" sz="1400" dirty="0"/>
@@ -8244,11 +8207,7 @@
             </a:r>
             <a:r>
               <a:rPr lang="en-US" sz="1400" dirty="0"/>
-              <a:t>"Price : %s %.2f" </a:t>
-            </a:r>
-            <a:r>
-              <a:rPr lang="en-US" sz="1400" dirty="0"/>
-              <a:t>% (</a:t>
+              <a:t>"Price : %s %.2f" % (</a:t>
             </a:r>
             <a:r>
               <a:rPr lang="en-US" sz="1400" dirty="0" err="1"/>
@@ -8256,31 +8215,7 @@
             </a:r>
             <a:r>
               <a:rPr lang="en-US" sz="1400" dirty="0"/>
-              <a:t>(</a:t>
-            </a:r>
-            <a:r>
-              <a:rPr lang="en-US" sz="1400" dirty="0"/>
-              <a:t>"price"</a:t>
-            </a:r>
-            <a:r>
-              <a:rPr lang="en-US" sz="1400" dirty="0"/>
-              <a:t>).get(</a:t>
-            </a:r>
-            <a:r>
-              <a:rPr lang="en-US" sz="1400" dirty="0"/>
-              <a:t>"currency"</a:t>
-            </a:r>
-            <a:r>
-              <a:rPr lang="en-US" sz="1400" dirty="0"/>
-              <a:t>)</a:t>
-            </a:r>
-            <a:r>
-              <a:rPr lang="en-US" sz="1400" dirty="0"/>
-              <a:t>, float</a:t>
-            </a:r>
-            <a:r>
-              <a:rPr lang="en-US" sz="1400" dirty="0"/>
-              <a:t>(</a:t>
+              <a:t>("price").get("currency"), float(</a:t>
             </a:r>
             <a:r>
               <a:rPr lang="en-US" sz="1400" dirty="0" err="1"/>
@@ -8288,15 +8223,7 @@
             </a:r>
             <a:r>
               <a:rPr lang="en-US" sz="1400" dirty="0"/>
-              <a:t>(</a:t>
-            </a:r>
-            <a:r>
-              <a:rPr lang="en-US" sz="1400" dirty="0"/>
-              <a:t>"price"</a:t>
-            </a:r>
-            <a:r>
-              <a:rPr lang="en-US" sz="1400" dirty="0"/>
-              <a:t>).text))</a:t>
+              <a:t>("price").text))</a:t>
             </a:r>
           </a:p>
         </p:txBody>
@@ -8799,19 +8726,7 @@
             </a:r>
             <a:r>
               <a:rPr lang="en-US" sz="1400" dirty="0"/>
-              <a:t> = </a:t>
-            </a:r>
-            <a:r>
-              <a:rPr lang="en-US" sz="1400" dirty="0"/>
-              <a:t>open</a:t>
-            </a:r>
-            <a:r>
-              <a:rPr lang="en-US" sz="1400" dirty="0"/>
-              <a:t>(</a:t>
-            </a:r>
-            <a:r>
-              <a:rPr lang="en-US" sz="1400" dirty="0"/>
-              <a:t>"../data/</a:t>
+              <a:t> = open("../data/</a:t>
             </a:r>
             <a:r>
               <a:rPr lang="en-US" sz="1400" dirty="0" err="1"/>
@@ -8819,11 +8734,7 @@
             </a:r>
             <a:r>
               <a:rPr lang="en-US" sz="1400" dirty="0"/>
-              <a:t>"</a:t>
-            </a:r>
-            <a:r>
-              <a:rPr lang="en-US" sz="1400" dirty="0"/>
-              <a:t>)</a:t>
+              <a:t>")</a:t>
             </a:r>
             <a:br>
               <a:rPr lang="en-US" sz="1400" dirty="0"/>
@@ -8887,26 +8798,14 @@
             </a:r>
             <a:r>
               <a:rPr lang="en-US" sz="1400" dirty="0"/>
-              <a:t>(</a:t>
-            </a:r>
-            <a:r>
-              <a:rPr lang="en-US" sz="1400" dirty="0"/>
-              <a:t>"book"</a:t>
-            </a:r>
-            <a:r>
-              <a:rPr lang="en-US" sz="1400" dirty="0"/>
-              <a:t>)</a:t>
+              <a:t>("book")</a:t>
             </a:r>
             <a:br>
               <a:rPr lang="en-US" sz="1400" dirty="0"/>
             </a:br>
             <a:r>
               <a:rPr lang="en-US" sz="1400" dirty="0"/>
-              <a:t>total = </a:t>
-            </a:r>
-            <a:r>
-              <a:rPr lang="en-US" sz="1400" dirty="0"/>
-              <a:t>0.0</a:t>
+              <a:t>total = 0.0</a:t>
             </a:r>
             <a:br>
               <a:rPr lang="en-US" sz="1400" dirty="0"/>
@@ -8940,23 +8839,7 @@
             </a:r>
             <a:r>
               <a:rPr lang="en-US" sz="1400" dirty="0"/>
-              <a:t>(</a:t>
-            </a:r>
-            <a:r>
-              <a:rPr lang="en-US" sz="1400" dirty="0"/>
-              <a:t>"price"</a:t>
-            </a:r>
-            <a:r>
-              <a:rPr lang="en-US" sz="1400" dirty="0"/>
-              <a:t>).get(</a:t>
-            </a:r>
-            <a:r>
-              <a:rPr lang="en-US" sz="1400" dirty="0"/>
-              <a:t>"currency"</a:t>
-            </a:r>
-            <a:r>
-              <a:rPr lang="en-US" sz="1400" dirty="0"/>
-              <a:t>)</a:t>
+              <a:t>("price").get("currency")</a:t>
             </a:r>
             <a:br>
               <a:rPr lang="en-US" sz="1400" dirty="0"/>
@@ -8971,30 +8854,14 @@
             </a:r>
             <a:r>
               <a:rPr lang="en-US" sz="1400" dirty="0"/>
-              <a:t>currency == </a:t>
-            </a:r>
-            <a:r>
-              <a:rPr lang="en-US" sz="1400" dirty="0"/>
-              <a:t>'EUR'</a:t>
-            </a:r>
-            <a:r>
-              <a:rPr lang="en-US" sz="1400" dirty="0"/>
-              <a:t>:</a:t>
+              <a:t>currency == 'EUR':</a:t>
             </a:r>
             <a:br>
               <a:rPr lang="en-US" sz="1400" dirty="0"/>
             </a:br>
             <a:r>
               <a:rPr lang="en-US" sz="1400" dirty="0"/>
-              <a:t>        total += </a:t>
-            </a:r>
-            <a:r>
-              <a:rPr lang="en-US" sz="1400" dirty="0"/>
-              <a:t>float</a:t>
-            </a:r>
-            <a:r>
-              <a:rPr lang="en-US" sz="1400" dirty="0"/>
-              <a:t>(</a:t>
+              <a:t>        total += float(</a:t>
             </a:r>
             <a:r>
               <a:rPr lang="en-US" sz="1400" dirty="0" err="1"/>
@@ -9002,19 +8869,7 @@
             </a:r>
             <a:r>
               <a:rPr lang="en-US" sz="1400" dirty="0"/>
-              <a:t>(</a:t>
-            </a:r>
-            <a:r>
-              <a:rPr lang="en-US" sz="1400" dirty="0"/>
-              <a:t>"price"</a:t>
-            </a:r>
-            <a:r>
-              <a:rPr lang="en-US" sz="1400" dirty="0"/>
-              <a:t>).text) * </a:t>
-            </a:r>
-            <a:r>
-              <a:rPr lang="en-US" sz="1400" dirty="0"/>
-              <a:t>1.14</a:t>
+              <a:t>("price").text) * 1.14</a:t>
             </a:r>
             <a:br>
               <a:rPr lang="en-US" sz="1400" dirty="0"/>
@@ -9036,15 +8891,7 @@
             </a:br>
             <a:r>
               <a:rPr lang="en-US" sz="1400" dirty="0"/>
-              <a:t>        total += </a:t>
-            </a:r>
-            <a:r>
-              <a:rPr lang="en-US" sz="1400" dirty="0"/>
-              <a:t>float</a:t>
-            </a:r>
-            <a:r>
-              <a:rPr lang="en-US" sz="1400" dirty="0"/>
-              <a:t>(</a:t>
+              <a:t>        total += float(</a:t>
             </a:r>
             <a:r>
               <a:rPr lang="en-US" sz="1400" dirty="0" err="1"/>
@@ -9052,15 +8899,7 @@
             </a:r>
             <a:r>
               <a:rPr lang="en-US" sz="1400" dirty="0"/>
-              <a:t>(</a:t>
-            </a:r>
-            <a:r>
-              <a:rPr lang="en-US" sz="1400" dirty="0"/>
-              <a:t>"price"</a:t>
-            </a:r>
-            <a:r>
-              <a:rPr lang="en-US" sz="1400" dirty="0"/>
-              <a:t>).text)</a:t>
+              <a:t>("price").text)</a:t>
             </a:r>
             <a:br>
               <a:rPr lang="en-US" sz="1400" dirty="0"/>
@@ -9078,11 +8917,7 @@
             </a:r>
             <a:r>
               <a:rPr lang="en-US" sz="1400" dirty="0"/>
-              <a:t>"Total: %.2f" </a:t>
-            </a:r>
-            <a:r>
-              <a:rPr lang="en-US" sz="1400" dirty="0"/>
-              <a:t>% total</a:t>
+              <a:t>"Total: %.2f" % total</a:t>
             </a:r>
             <a:br>
               <a:rPr lang="en-US" sz="1400" dirty="0"/>
@@ -10876,19 +10711,7 @@
             </a:r>
             <a:r>
               <a:rPr lang="en-US" sz="1400" dirty="0"/>
-              <a:t> = </a:t>
-            </a:r>
-            <a:r>
-              <a:rPr lang="en-US" sz="1400" dirty="0"/>
-              <a:t>open</a:t>
-            </a:r>
-            <a:r>
-              <a:rPr lang="en-US" sz="1400" dirty="0"/>
-              <a:t>(</a:t>
-            </a:r>
-            <a:r>
-              <a:rPr lang="en-US" sz="1400" dirty="0"/>
-              <a:t>"../data/</a:t>
+              <a:t> = open("../data/</a:t>
             </a:r>
             <a:r>
               <a:rPr lang="en-US" sz="1400" dirty="0" err="1"/>
@@ -10896,11 +10719,7 @@
             </a:r>
             <a:r>
               <a:rPr lang="en-US" sz="1400" dirty="0"/>
-              <a:t>"</a:t>
-            </a:r>
-            <a:r>
-              <a:rPr lang="en-US" sz="1400" dirty="0"/>
-              <a:t>)</a:t>
+              <a:t>")</a:t>
             </a:r>
             <a:br>
               <a:rPr lang="en-US" sz="1400" dirty="0"/>
@@ -10960,11 +10779,7 @@
             </a:br>
             <a:r>
               <a:rPr lang="en-US" sz="1400" dirty="0"/>
-              <a:t>total = </a:t>
-            </a:r>
-            <a:r>
-              <a:rPr lang="en-US" sz="1400" dirty="0"/>
-              <a:t>0.0</a:t>
+              <a:t>total = 0.0</a:t>
             </a:r>
             <a:br>
               <a:rPr lang="en-US" sz="1400" dirty="0"/>
@@ -10994,23 +10809,7 @@
             </a:br>
             <a:r>
               <a:rPr lang="en-US" sz="1400" dirty="0"/>
-              <a:t>    currency = item[</a:t>
-            </a:r>
-            <a:r>
-              <a:rPr lang="en-US" sz="1400" dirty="0"/>
-              <a:t>"price"</a:t>
-            </a:r>
-            <a:r>
-              <a:rPr lang="en-US" sz="1400" dirty="0"/>
-              <a:t>][</a:t>
-            </a:r>
-            <a:r>
-              <a:rPr lang="en-US" sz="1400" dirty="0"/>
-              <a:t>"currency"</a:t>
-            </a:r>
-            <a:r>
-              <a:rPr lang="en-US" sz="1400" dirty="0"/>
-              <a:t>]</a:t>
+              <a:t>    currency = item["price"]["currency"]</a:t>
             </a:r>
             <a:br>
               <a:rPr lang="en-US" sz="1400" dirty="0"/>
@@ -11025,30 +10824,14 @@
             </a:r>
             <a:r>
               <a:rPr lang="en-US" sz="1400" dirty="0"/>
-              <a:t>currency == </a:t>
-            </a:r>
-            <a:r>
-              <a:rPr lang="en-US" sz="1400" dirty="0"/>
-              <a:t>'EUR'</a:t>
-            </a:r>
-            <a:r>
-              <a:rPr lang="en-US" sz="1400" dirty="0"/>
-              <a:t>:</a:t>
+              <a:t>currency == 'EUR':</a:t>
             </a:r>
             <a:br>
               <a:rPr lang="en-US" sz="1400" dirty="0"/>
             </a:br>
             <a:r>
               <a:rPr lang="en-US" sz="1400" dirty="0"/>
-              <a:t>        total += </a:t>
-            </a:r>
-            <a:r>
-              <a:rPr lang="en-US" sz="1400" dirty="0"/>
-              <a:t>float</a:t>
-            </a:r>
-            <a:r>
-              <a:rPr lang="en-US" sz="1400" dirty="0"/>
-              <a:t>(</a:t>
+              <a:t>        total += float(</a:t>
             </a:r>
             <a:r>
               <a:rPr lang="en-US" sz="1400" dirty="0" err="1"/>
@@ -11056,27 +10839,7 @@
             </a:r>
             <a:r>
               <a:rPr lang="en-US" sz="1400" dirty="0"/>
-              <a:t>(</a:t>
-            </a:r>
-            <a:r>
-              <a:rPr lang="en-US" sz="1400" dirty="0"/>
-              <a:t>"price"</a:t>
-            </a:r>
-            <a:r>
-              <a:rPr lang="en-US" sz="1400" dirty="0"/>
-              <a:t>).get(</a:t>
-            </a:r>
-            <a:r>
-              <a:rPr lang="en-US" sz="1400" dirty="0"/>
-              <a:t>"price"</a:t>
-            </a:r>
-            <a:r>
-              <a:rPr lang="en-US" sz="1400" dirty="0"/>
-              <a:t>)) * </a:t>
-            </a:r>
-            <a:r>
-              <a:rPr lang="en-US" sz="1400" dirty="0"/>
-              <a:t>1.14</a:t>
+              <a:t>("price").get("price")) * 1.14</a:t>
             </a:r>
             <a:br>
               <a:rPr lang="en-US" sz="1400" dirty="0"/>
@@ -11098,15 +10861,7 @@
             </a:br>
             <a:r>
               <a:rPr lang="en-US" sz="1400" dirty="0"/>
-              <a:t>        total += </a:t>
-            </a:r>
-            <a:r>
-              <a:rPr lang="en-US" sz="1400" dirty="0"/>
-              <a:t>float</a:t>
-            </a:r>
-            <a:r>
-              <a:rPr lang="en-US" sz="1400" dirty="0"/>
-              <a:t>(</a:t>
+              <a:t>        total += float(</a:t>
             </a:r>
             <a:r>
               <a:rPr lang="en-US" sz="1400" dirty="0" err="1"/>
@@ -11114,23 +10869,7 @@
             </a:r>
             <a:r>
               <a:rPr lang="en-US" sz="1400" dirty="0"/>
-              <a:t>(</a:t>
-            </a:r>
-            <a:r>
-              <a:rPr lang="en-US" sz="1400" dirty="0"/>
-              <a:t>"price"</a:t>
-            </a:r>
-            <a:r>
-              <a:rPr lang="en-US" sz="1400" dirty="0"/>
-              <a:t>).get(</a:t>
-            </a:r>
-            <a:r>
-              <a:rPr lang="en-US" sz="1400" dirty="0"/>
-              <a:t>"price"</a:t>
-            </a:r>
-            <a:r>
-              <a:rPr lang="en-US" sz="1400" dirty="0"/>
-              <a:t>))</a:t>
+              <a:t>("price").get("price"))</a:t>
             </a:r>
             <a:br>
               <a:rPr lang="en-US" sz="1400" dirty="0"/>
@@ -11148,11 +10887,7 @@
             </a:r>
             <a:r>
               <a:rPr lang="en-US" sz="1400" dirty="0"/>
-              <a:t>"Total: %.2f" </a:t>
-            </a:r>
-            <a:r>
-              <a:rPr lang="en-US" sz="1400" dirty="0"/>
-              <a:t>% total </a:t>
+              <a:t>"Total: %.2f" % total </a:t>
             </a:r>
             <a:br>
               <a:rPr lang="en-US" sz="1400" dirty="0"/>

</xml_diff>